<commit_message>
Minor Update to UI
</commit_message>
<xml_diff>
--- a/SnapVac3D-v1.0/ReadMeImages/ReadMePPT.pptx
+++ b/SnapVac3D-v1.0/ReadMeImages/ReadMePPT.pptx
@@ -261,7 +261,7 @@
           <a:p>
             <a:fld id="{4B1707ED-34AF-4580-B1E9-E117694A1AC2}" type="datetimeFigureOut">
               <a:rPr lang="en-GB" smtClean="0"/>
-              <a:t>27/11/2024</a:t>
+              <a:t>18/12/2024</a:t>
             </a:fld>
             <a:endParaRPr lang="en-GB"/>
           </a:p>
@@ -461,7 +461,7 @@
           <a:p>
             <a:fld id="{4B1707ED-34AF-4580-B1E9-E117694A1AC2}" type="datetimeFigureOut">
               <a:rPr lang="en-GB" smtClean="0"/>
-              <a:t>27/11/2024</a:t>
+              <a:t>18/12/2024</a:t>
             </a:fld>
             <a:endParaRPr lang="en-GB"/>
           </a:p>
@@ -671,7 +671,7 @@
           <a:p>
             <a:fld id="{4B1707ED-34AF-4580-B1E9-E117694A1AC2}" type="datetimeFigureOut">
               <a:rPr lang="en-GB" smtClean="0"/>
-              <a:t>27/11/2024</a:t>
+              <a:t>18/12/2024</a:t>
             </a:fld>
             <a:endParaRPr lang="en-GB"/>
           </a:p>
@@ -871,7 +871,7 @@
           <a:p>
             <a:fld id="{4B1707ED-34AF-4580-B1E9-E117694A1AC2}" type="datetimeFigureOut">
               <a:rPr lang="en-GB" smtClean="0"/>
-              <a:t>27/11/2024</a:t>
+              <a:t>18/12/2024</a:t>
             </a:fld>
             <a:endParaRPr lang="en-GB"/>
           </a:p>
@@ -1147,7 +1147,7 @@
           <a:p>
             <a:fld id="{4B1707ED-34AF-4580-B1E9-E117694A1AC2}" type="datetimeFigureOut">
               <a:rPr lang="en-GB" smtClean="0"/>
-              <a:t>27/11/2024</a:t>
+              <a:t>18/12/2024</a:t>
             </a:fld>
             <a:endParaRPr lang="en-GB"/>
           </a:p>
@@ -1415,7 +1415,7 @@
           <a:p>
             <a:fld id="{4B1707ED-34AF-4580-B1E9-E117694A1AC2}" type="datetimeFigureOut">
               <a:rPr lang="en-GB" smtClean="0"/>
-              <a:t>27/11/2024</a:t>
+              <a:t>18/12/2024</a:t>
             </a:fld>
             <a:endParaRPr lang="en-GB"/>
           </a:p>
@@ -1830,7 +1830,7 @@
           <a:p>
             <a:fld id="{4B1707ED-34AF-4580-B1E9-E117694A1AC2}" type="datetimeFigureOut">
               <a:rPr lang="en-GB" smtClean="0"/>
-              <a:t>27/11/2024</a:t>
+              <a:t>18/12/2024</a:t>
             </a:fld>
             <a:endParaRPr lang="en-GB"/>
           </a:p>
@@ -1972,7 +1972,7 @@
           <a:p>
             <a:fld id="{4B1707ED-34AF-4580-B1E9-E117694A1AC2}" type="datetimeFigureOut">
               <a:rPr lang="en-GB" smtClean="0"/>
-              <a:t>27/11/2024</a:t>
+              <a:t>18/12/2024</a:t>
             </a:fld>
             <a:endParaRPr lang="en-GB"/>
           </a:p>
@@ -2085,7 +2085,7 @@
           <a:p>
             <a:fld id="{4B1707ED-34AF-4580-B1E9-E117694A1AC2}" type="datetimeFigureOut">
               <a:rPr lang="en-GB" smtClean="0"/>
-              <a:t>27/11/2024</a:t>
+              <a:t>18/12/2024</a:t>
             </a:fld>
             <a:endParaRPr lang="en-GB"/>
           </a:p>
@@ -2398,7 +2398,7 @@
           <a:p>
             <a:fld id="{4B1707ED-34AF-4580-B1E9-E117694A1AC2}" type="datetimeFigureOut">
               <a:rPr lang="en-GB" smtClean="0"/>
-              <a:t>27/11/2024</a:t>
+              <a:t>18/12/2024</a:t>
             </a:fld>
             <a:endParaRPr lang="en-GB"/>
           </a:p>
@@ -2687,7 +2687,7 @@
           <a:p>
             <a:fld id="{4B1707ED-34AF-4580-B1E9-E117694A1AC2}" type="datetimeFigureOut">
               <a:rPr lang="en-GB" smtClean="0"/>
-              <a:t>27/11/2024</a:t>
+              <a:t>18/12/2024</a:t>
             </a:fld>
             <a:endParaRPr lang="en-GB"/>
           </a:p>
@@ -2930,7 +2930,7 @@
           <a:p>
             <a:fld id="{4B1707ED-34AF-4580-B1E9-E117694A1AC2}" type="datetimeFigureOut">
               <a:rPr lang="en-GB" smtClean="0"/>
-              <a:t>27/11/2024</a:t>
+              <a:t>18/12/2024</a:t>
             </a:fld>
             <a:endParaRPr lang="en-GB"/>
           </a:p>
@@ -3349,6 +3349,47 @@
       </p:grpSpPr>
       <p:pic>
         <p:nvPicPr>
+          <p:cNvPr id="4" name="Picture 3" descr="A screenshot of a computer&#10;&#10;Description automatically generated">
+            <a:extLst>
+              <a:ext uri="{FF2B5EF4-FFF2-40B4-BE49-F238E27FC236}">
+                <a16:creationId xmlns:a16="http://schemas.microsoft.com/office/drawing/2014/main" id="{8BFE1B3A-48A2-2245-2E18-5327CE43763D}"/>
+              </a:ext>
+            </a:extLst>
+          </p:cNvPr>
+          <p:cNvPicPr>
+            <a:picLocks noChangeAspect="1"/>
+          </p:cNvPicPr>
+          <p:nvPr/>
+        </p:nvPicPr>
+        <p:blipFill>
+          <a:blip r:embed="rId2">
+            <a:extLst>
+              <a:ext uri="{28A0092B-C50C-407E-A947-70E740481C1C}">
+                <a14:useLocalDpi xmlns:a14="http://schemas.microsoft.com/office/drawing/2010/main" val="0"/>
+              </a:ext>
+            </a:extLst>
+          </a:blip>
+          <a:stretch>
+            <a:fillRect/>
+          </a:stretch>
+        </p:blipFill>
+        <p:spPr>
+          <a:xfrm>
+            <a:off x="321973" y="508224"/>
+            <a:ext cx="11548052" cy="4020330"/>
+          </a:xfrm>
+          <a:prstGeom prst="rect">
+            <a:avLst/>
+          </a:prstGeom>
+          <a:ln>
+            <a:solidFill>
+              <a:schemeClr val="tx1"/>
+            </a:solidFill>
+          </a:ln>
+        </p:spPr>
+      </p:pic>
+      <p:pic>
+        <p:nvPicPr>
           <p:cNvPr id="11" name="Picture 10">
             <a:extLst>
               <a:ext uri="{FF2B5EF4-FFF2-40B4-BE49-F238E27FC236}">
@@ -3362,7 +3403,7 @@
           <p:nvPr/>
         </p:nvPicPr>
         <p:blipFill rotWithShape="1">
-          <a:blip r:embed="rId2"/>
+          <a:blip r:embed="rId3"/>
           <a:srcRect l="14000" t="24668" r="12395" b="11442"/>
           <a:stretch/>
         </p:blipFill>
@@ -3457,7 +3498,7 @@
           <p:nvPr/>
         </p:nvPicPr>
         <p:blipFill rotWithShape="1">
-          <a:blip r:embed="rId3">
+          <a:blip r:embed="rId4">
             <a:extLst>
               <a:ext uri="{28A0092B-C50C-407E-A947-70E740481C1C}">
                 <a14:useLocalDpi xmlns:a14="http://schemas.microsoft.com/office/drawing/2010/main" val="0"/>
@@ -3492,7 +3533,7 @@
           <p:nvPr/>
         </p:nvPicPr>
         <p:blipFill rotWithShape="1">
-          <a:blip r:embed="rId4">
+          <a:blip r:embed="rId5">
             <a:extLst>
               <a:ext uri="{28A0092B-C50C-407E-A947-70E740481C1C}">
                 <a14:useLocalDpi xmlns:a14="http://schemas.microsoft.com/office/drawing/2010/main" val="0"/>
@@ -3527,7 +3568,7 @@
           <p:nvPr/>
         </p:nvPicPr>
         <p:blipFill rotWithShape="1">
-          <a:blip r:embed="rId5">
+          <a:blip r:embed="rId6">
             <a:extLst>
               <a:ext uri="{28A0092B-C50C-407E-A947-70E740481C1C}">
                 <a14:useLocalDpi xmlns:a14="http://schemas.microsoft.com/office/drawing/2010/main" val="0"/>
@@ -3562,7 +3603,7 @@
           <p:nvPr/>
         </p:nvPicPr>
         <p:blipFill rotWithShape="1">
-          <a:blip r:embed="rId6">
+          <a:blip r:embed="rId7">
             <a:extLst>
               <a:ext uri="{28A0092B-C50C-407E-A947-70E740481C1C}">
                 <a14:useLocalDpi xmlns:a14="http://schemas.microsoft.com/office/drawing/2010/main" val="0"/>
@@ -3580,47 +3621,6 @@
           <a:prstGeom prst="rect">
             <a:avLst/>
           </a:prstGeom>
-        </p:spPr>
-      </p:pic>
-      <p:pic>
-        <p:nvPicPr>
-          <p:cNvPr id="3" name="Picture 2" descr="A screenshot of a computer&#10;&#10;Description automatically generated">
-            <a:extLst>
-              <a:ext uri="{FF2B5EF4-FFF2-40B4-BE49-F238E27FC236}">
-                <a16:creationId xmlns:a16="http://schemas.microsoft.com/office/drawing/2014/main" id="{73A43B97-99BD-B1FB-F059-B811C2285138}"/>
-              </a:ext>
-            </a:extLst>
-          </p:cNvPr>
-          <p:cNvPicPr>
-            <a:picLocks noChangeAspect="1"/>
-          </p:cNvPicPr>
-          <p:nvPr/>
-        </p:nvPicPr>
-        <p:blipFill>
-          <a:blip r:embed="rId7">
-            <a:extLst>
-              <a:ext uri="{28A0092B-C50C-407E-A947-70E740481C1C}">
-                <a14:useLocalDpi xmlns:a14="http://schemas.microsoft.com/office/drawing/2010/main" val="0"/>
-              </a:ext>
-            </a:extLst>
-          </a:blip>
-          <a:stretch>
-            <a:fillRect/>
-          </a:stretch>
-        </p:blipFill>
-        <p:spPr>
-          <a:xfrm>
-            <a:off x="321974" y="508225"/>
-            <a:ext cx="11548053" cy="4072877"/>
-          </a:xfrm>
-          <a:prstGeom prst="rect">
-            <a:avLst/>
-          </a:prstGeom>
-          <a:ln>
-            <a:solidFill>
-              <a:schemeClr val="tx1"/>
-            </a:solidFill>
-          </a:ln>
         </p:spPr>
       </p:pic>
     </p:spTree>

</xml_diff>